<commit_message>
Creación de bombas fila / columna ahora dependiendo del ángulo de deslizamiento
*Cambio de nombre verificarBombas a CrearBombas (tal vez se mal interpretaba lo que realiza)
</commit_message>
<xml_diff>
--- a/ADC/Assets/Match-3/Diagrama de flujo para las funciones del Match-3.pptx
+++ b/ADC/Assets/Match-3/Diagrama de flujo para las funciones del Match-3.pptx
@@ -107,6 +107,11 @@
       </a:defRPr>
     </a:lvl9pPr>
   </p:defaultTextStyle>
+  <p:extLst>
+    <p:ext uri="{EFAFB233-063F-42B5-8137-9DF3F51BA10A}">
+      <p15:sldGuideLst xmlns:p15="http://schemas.microsoft.com/office/powerpoint/2012/main"/>
+    </p:ext>
+  </p:extLst>
 </p:presentation>
 </file>
 
@@ -259,7 +264,7 @@
           <a:p>
             <a:fld id="{8F9C2930-072E-441F-B32B-D4EF9ECF494B}" type="datetimeFigureOut">
               <a:rPr lang="es-MX" smtClean="0"/>
-              <a:t>27/08/2020</a:t>
+              <a:t>03/09/2020</a:t>
             </a:fld>
             <a:endParaRPr lang="es-MX"/>
           </a:p>
@@ -459,7 +464,7 @@
           <a:p>
             <a:fld id="{8F9C2930-072E-441F-B32B-D4EF9ECF494B}" type="datetimeFigureOut">
               <a:rPr lang="es-MX" smtClean="0"/>
-              <a:t>27/08/2020</a:t>
+              <a:t>03/09/2020</a:t>
             </a:fld>
             <a:endParaRPr lang="es-MX"/>
           </a:p>
@@ -669,7 +674,7 @@
           <a:p>
             <a:fld id="{8F9C2930-072E-441F-B32B-D4EF9ECF494B}" type="datetimeFigureOut">
               <a:rPr lang="es-MX" smtClean="0"/>
-              <a:t>27/08/2020</a:t>
+              <a:t>03/09/2020</a:t>
             </a:fld>
             <a:endParaRPr lang="es-MX"/>
           </a:p>
@@ -869,7 +874,7 @@
           <a:p>
             <a:fld id="{8F9C2930-072E-441F-B32B-D4EF9ECF494B}" type="datetimeFigureOut">
               <a:rPr lang="es-MX" smtClean="0"/>
-              <a:t>27/08/2020</a:t>
+              <a:t>03/09/2020</a:t>
             </a:fld>
             <a:endParaRPr lang="es-MX"/>
           </a:p>
@@ -1145,7 +1150,7 @@
           <a:p>
             <a:fld id="{8F9C2930-072E-441F-B32B-D4EF9ECF494B}" type="datetimeFigureOut">
               <a:rPr lang="es-MX" smtClean="0"/>
-              <a:t>27/08/2020</a:t>
+              <a:t>03/09/2020</a:t>
             </a:fld>
             <a:endParaRPr lang="es-MX"/>
           </a:p>
@@ -1413,7 +1418,7 @@
           <a:p>
             <a:fld id="{8F9C2930-072E-441F-B32B-D4EF9ECF494B}" type="datetimeFigureOut">
               <a:rPr lang="es-MX" smtClean="0"/>
-              <a:t>27/08/2020</a:t>
+              <a:t>03/09/2020</a:t>
             </a:fld>
             <a:endParaRPr lang="es-MX"/>
           </a:p>
@@ -1828,7 +1833,7 @@
           <a:p>
             <a:fld id="{8F9C2930-072E-441F-B32B-D4EF9ECF494B}" type="datetimeFigureOut">
               <a:rPr lang="es-MX" smtClean="0"/>
-              <a:t>27/08/2020</a:t>
+              <a:t>03/09/2020</a:t>
             </a:fld>
             <a:endParaRPr lang="es-MX"/>
           </a:p>
@@ -1970,7 +1975,7 @@
           <a:p>
             <a:fld id="{8F9C2930-072E-441F-B32B-D4EF9ECF494B}" type="datetimeFigureOut">
               <a:rPr lang="es-MX" smtClean="0"/>
-              <a:t>27/08/2020</a:t>
+              <a:t>03/09/2020</a:t>
             </a:fld>
             <a:endParaRPr lang="es-MX"/>
           </a:p>
@@ -2083,7 +2088,7 @@
           <a:p>
             <a:fld id="{8F9C2930-072E-441F-B32B-D4EF9ECF494B}" type="datetimeFigureOut">
               <a:rPr lang="es-MX" smtClean="0"/>
-              <a:t>27/08/2020</a:t>
+              <a:t>03/09/2020</a:t>
             </a:fld>
             <a:endParaRPr lang="es-MX"/>
           </a:p>
@@ -2396,7 +2401,7 @@
           <a:p>
             <a:fld id="{8F9C2930-072E-441F-B32B-D4EF9ECF494B}" type="datetimeFigureOut">
               <a:rPr lang="es-MX" smtClean="0"/>
-              <a:t>27/08/2020</a:t>
+              <a:t>03/09/2020</a:t>
             </a:fld>
             <a:endParaRPr lang="es-MX"/>
           </a:p>
@@ -2685,7 +2690,7 @@
           <a:p>
             <a:fld id="{8F9C2930-072E-441F-B32B-D4EF9ECF494B}" type="datetimeFigureOut">
               <a:rPr lang="es-MX" smtClean="0"/>
-              <a:t>27/08/2020</a:t>
+              <a:t>03/09/2020</a:t>
             </a:fld>
             <a:endParaRPr lang="es-MX"/>
           </a:p>
@@ -2928,7 +2933,7 @@
           <a:p>
             <a:fld id="{8F9C2930-072E-441F-B32B-D4EF9ECF494B}" type="datetimeFigureOut">
               <a:rPr lang="es-MX" smtClean="0"/>
-              <a:t>27/08/2020</a:t>
+              <a:t>03/09/2020</a:t>
             </a:fld>
             <a:endParaRPr lang="es-MX"/>
           </a:p>
@@ -3413,10 +3418,10 @@
       </p:grpSpPr>
       <p:pic>
         <p:nvPicPr>
-          <p:cNvPr id="3" name="Imagen 2">
-            <a:extLst>
-              <a:ext uri="{FF2B5EF4-FFF2-40B4-BE49-F238E27FC236}">
-                <a16:creationId xmlns:a16="http://schemas.microsoft.com/office/drawing/2014/main" id="{C0AAB152-13FB-4BBB-8ED1-DA607ED8B080}"/>
+          <p:cNvPr id="2" name="Imagen 1">
+            <a:extLst>
+              <a:ext uri="{FF2B5EF4-FFF2-40B4-BE49-F238E27FC236}">
+                <a16:creationId xmlns:a16="http://schemas.microsoft.com/office/drawing/2014/main" id="{89B3B3B7-0CF9-4905-A520-238B3E0A9081}"/>
               </a:ext>
             </a:extLst>
           </p:cNvPr>
@@ -3439,8 +3444,44 @@
         </p:blipFill>
         <p:spPr>
           <a:xfrm>
-            <a:off x="2505074" y="153779"/>
-            <a:ext cx="6414585" cy="6704221"/>
+            <a:off x="2208704" y="2657514"/>
+            <a:ext cx="2390476" cy="628571"/>
+          </a:xfrm>
+          <a:prstGeom prst="rect">
+            <a:avLst/>
+          </a:prstGeom>
+        </p:spPr>
+      </p:pic>
+      <p:pic>
+        <p:nvPicPr>
+          <p:cNvPr id="9" name="Imagen 8" descr="Captura de pantalla de computadora&#10;&#10;Descripción generada automáticamente">
+            <a:extLst>
+              <a:ext uri="{FF2B5EF4-FFF2-40B4-BE49-F238E27FC236}">
+                <a16:creationId xmlns:a16="http://schemas.microsoft.com/office/drawing/2014/main" id="{E90A1FD1-9FD9-4AD5-B103-2C90E89993B1}"/>
+              </a:ext>
+            </a:extLst>
+          </p:cNvPr>
+          <p:cNvPicPr>
+            <a:picLocks noChangeAspect="1"/>
+          </p:cNvPicPr>
+          <p:nvPr/>
+        </p:nvPicPr>
+        <p:blipFill>
+          <a:blip r:embed="rId3">
+            <a:extLst>
+              <a:ext uri="{28A0092B-C50C-407E-A947-70E740481C1C}">
+                <a14:useLocalDpi xmlns:a14="http://schemas.microsoft.com/office/drawing/2010/main" val="0"/>
+              </a:ext>
+            </a:extLst>
+          </a:blip>
+          <a:stretch>
+            <a:fillRect/>
+          </a:stretch>
+        </p:blipFill>
+        <p:spPr>
+          <a:xfrm>
+            <a:off x="5087945" y="421766"/>
+            <a:ext cx="5675305" cy="6014467"/>
           </a:xfrm>
           <a:prstGeom prst="rect">
             <a:avLst/>
@@ -3515,10 +3556,10 @@
       </p:pic>
       <p:pic>
         <p:nvPicPr>
-          <p:cNvPr id="6" name="Imagen 5" descr="Pantalla de un video juego&#10;&#10;Descripción generada automáticamente">
-            <a:extLst>
-              <a:ext uri="{FF2B5EF4-FFF2-40B4-BE49-F238E27FC236}">
-                <a16:creationId xmlns:a16="http://schemas.microsoft.com/office/drawing/2014/main" id="{FDA8410E-470C-42EA-9D08-555DCF0B7D74}"/>
+          <p:cNvPr id="7" name="Imagen 6" descr="Captura de pantalla de un videojuego&#10;&#10;Descripción generada automáticamente">
+            <a:extLst>
+              <a:ext uri="{FF2B5EF4-FFF2-40B4-BE49-F238E27FC236}">
+                <a16:creationId xmlns:a16="http://schemas.microsoft.com/office/drawing/2014/main" id="{AF1B327A-8101-49BC-9FEC-EDE3B46A833F}"/>
               </a:ext>
             </a:extLst>
           </p:cNvPr>
@@ -3527,7 +3568,7 @@
           </p:cNvPicPr>
           <p:nvPr/>
         </p:nvPicPr>
-        <p:blipFill rotWithShape="1">
+        <p:blipFill>
           <a:blip r:embed="rId3">
             <a:extLst>
               <a:ext uri="{28A0092B-C50C-407E-A947-70E740481C1C}">
@@ -3535,13 +3576,14 @@
               </a:ext>
             </a:extLst>
           </a:blip>
-          <a:srcRect t="-1" b="34781"/>
-          <a:stretch/>
+          <a:stretch>
+            <a:fillRect/>
+          </a:stretch>
         </p:blipFill>
         <p:spPr>
           <a:xfrm>
-            <a:off x="5548015" y="284298"/>
-            <a:ext cx="4791074" cy="6573702"/>
+            <a:off x="5476240" y="141062"/>
+            <a:ext cx="4744720" cy="6548312"/>
           </a:xfrm>
           <a:prstGeom prst="rect">
             <a:avLst/>

</xml_diff>

<commit_message>
Actualización de algoritmo para que no exista match al principio de llenar el tablero
*Incluye script para diseño de posibles niveles
</commit_message>
<xml_diff>
--- a/ADC/Assets/Match-3/Diagrama de flujo para las funciones del Match-3.pptx
+++ b/ADC/Assets/Match-3/Diagrama de flujo para las funciones del Match-3.pptx
@@ -264,7 +264,7 @@
           <a:p>
             <a:fld id="{8F9C2930-072E-441F-B32B-D4EF9ECF494B}" type="datetimeFigureOut">
               <a:rPr lang="es-MX" smtClean="0"/>
-              <a:t>03/09/2020</a:t>
+              <a:t>09/09/2020</a:t>
             </a:fld>
             <a:endParaRPr lang="es-MX"/>
           </a:p>
@@ -464,7 +464,7 @@
           <a:p>
             <a:fld id="{8F9C2930-072E-441F-B32B-D4EF9ECF494B}" type="datetimeFigureOut">
               <a:rPr lang="es-MX" smtClean="0"/>
-              <a:t>03/09/2020</a:t>
+              <a:t>09/09/2020</a:t>
             </a:fld>
             <a:endParaRPr lang="es-MX"/>
           </a:p>
@@ -674,7 +674,7 @@
           <a:p>
             <a:fld id="{8F9C2930-072E-441F-B32B-D4EF9ECF494B}" type="datetimeFigureOut">
               <a:rPr lang="es-MX" smtClean="0"/>
-              <a:t>03/09/2020</a:t>
+              <a:t>09/09/2020</a:t>
             </a:fld>
             <a:endParaRPr lang="es-MX"/>
           </a:p>
@@ -874,7 +874,7 @@
           <a:p>
             <a:fld id="{8F9C2930-072E-441F-B32B-D4EF9ECF494B}" type="datetimeFigureOut">
               <a:rPr lang="es-MX" smtClean="0"/>
-              <a:t>03/09/2020</a:t>
+              <a:t>09/09/2020</a:t>
             </a:fld>
             <a:endParaRPr lang="es-MX"/>
           </a:p>
@@ -1150,7 +1150,7 @@
           <a:p>
             <a:fld id="{8F9C2930-072E-441F-B32B-D4EF9ECF494B}" type="datetimeFigureOut">
               <a:rPr lang="es-MX" smtClean="0"/>
-              <a:t>03/09/2020</a:t>
+              <a:t>09/09/2020</a:t>
             </a:fld>
             <a:endParaRPr lang="es-MX"/>
           </a:p>
@@ -1418,7 +1418,7 @@
           <a:p>
             <a:fld id="{8F9C2930-072E-441F-B32B-D4EF9ECF494B}" type="datetimeFigureOut">
               <a:rPr lang="es-MX" smtClean="0"/>
-              <a:t>03/09/2020</a:t>
+              <a:t>09/09/2020</a:t>
             </a:fld>
             <a:endParaRPr lang="es-MX"/>
           </a:p>
@@ -1833,7 +1833,7 @@
           <a:p>
             <a:fld id="{8F9C2930-072E-441F-B32B-D4EF9ECF494B}" type="datetimeFigureOut">
               <a:rPr lang="es-MX" smtClean="0"/>
-              <a:t>03/09/2020</a:t>
+              <a:t>09/09/2020</a:t>
             </a:fld>
             <a:endParaRPr lang="es-MX"/>
           </a:p>
@@ -1975,7 +1975,7 @@
           <a:p>
             <a:fld id="{8F9C2930-072E-441F-B32B-D4EF9ECF494B}" type="datetimeFigureOut">
               <a:rPr lang="es-MX" smtClean="0"/>
-              <a:t>03/09/2020</a:t>
+              <a:t>09/09/2020</a:t>
             </a:fld>
             <a:endParaRPr lang="es-MX"/>
           </a:p>
@@ -2088,7 +2088,7 @@
           <a:p>
             <a:fld id="{8F9C2930-072E-441F-B32B-D4EF9ECF494B}" type="datetimeFigureOut">
               <a:rPr lang="es-MX" smtClean="0"/>
-              <a:t>03/09/2020</a:t>
+              <a:t>09/09/2020</a:t>
             </a:fld>
             <a:endParaRPr lang="es-MX"/>
           </a:p>
@@ -2401,7 +2401,7 @@
           <a:p>
             <a:fld id="{8F9C2930-072E-441F-B32B-D4EF9ECF494B}" type="datetimeFigureOut">
               <a:rPr lang="es-MX" smtClean="0"/>
-              <a:t>03/09/2020</a:t>
+              <a:t>09/09/2020</a:t>
             </a:fld>
             <a:endParaRPr lang="es-MX"/>
           </a:p>
@@ -2690,7 +2690,7 @@
           <a:p>
             <a:fld id="{8F9C2930-072E-441F-B32B-D4EF9ECF494B}" type="datetimeFigureOut">
               <a:rPr lang="es-MX" smtClean="0"/>
-              <a:t>03/09/2020</a:t>
+              <a:t>09/09/2020</a:t>
             </a:fld>
             <a:endParaRPr lang="es-MX"/>
           </a:p>
@@ -2933,7 +2933,7 @@
           <a:p>
             <a:fld id="{8F9C2930-072E-441F-B32B-D4EF9ECF494B}" type="datetimeFigureOut">
               <a:rPr lang="es-MX" smtClean="0"/>
-              <a:t>03/09/2020</a:t>
+              <a:t>09/09/2020</a:t>
             </a:fld>
             <a:endParaRPr lang="es-MX"/>
           </a:p>
@@ -3352,10 +3352,10 @@
       </p:grpSpPr>
       <p:pic>
         <p:nvPicPr>
-          <p:cNvPr id="5" name="Imagen 4" descr="Captura de pantalla de un videojuego&#10;&#10;Descripción generada automáticamente">
-            <a:extLst>
-              <a:ext uri="{FF2B5EF4-FFF2-40B4-BE49-F238E27FC236}">
-                <a16:creationId xmlns:a16="http://schemas.microsoft.com/office/drawing/2014/main" id="{B99D7ADD-6964-4D5E-B517-D159C44C1A10}"/>
+          <p:cNvPr id="6" name="Imagen 5" descr="Imagen que contiene oscuro, reloj&#10;&#10;Descripción generada automáticamente">
+            <a:extLst>
+              <a:ext uri="{FF2B5EF4-FFF2-40B4-BE49-F238E27FC236}">
+                <a16:creationId xmlns:a16="http://schemas.microsoft.com/office/drawing/2014/main" id="{219E9E64-95C3-483C-B75C-6AB229739186}"/>
               </a:ext>
             </a:extLst>
           </p:cNvPr>
@@ -3378,8 +3378,8 @@
         </p:blipFill>
         <p:spPr>
           <a:xfrm>
-            <a:off x="2600731" y="814664"/>
-            <a:ext cx="6495238" cy="4428571"/>
+            <a:off x="2848381" y="1881381"/>
+            <a:ext cx="6495238" cy="3095238"/>
           </a:xfrm>
           <a:prstGeom prst="rect">
             <a:avLst/>

</xml_diff>